<commit_message>
feat: knn k-nearest neighbors
</commit_message>
<xml_diff>
--- a/slides/04_ML_K-Means.pptx
+++ b/slides/04_ML_K-Means.pptx
@@ -5,7 +5,7 @@
     <p:sldMasterId id="2147483648" r:id="rId1"/>
   </p:sldMasterIdLst>
   <p:notesMasterIdLst>
-    <p:notesMasterId r:id="rId38"/>
+    <p:notesMasterId r:id="rId40"/>
   </p:notesMasterIdLst>
   <p:sldIdLst>
     <p:sldId id="281" r:id="rId2"/>
@@ -44,6 +44,8 @@
     <p:sldId id="306" r:id="rId35"/>
     <p:sldId id="304" r:id="rId36"/>
     <p:sldId id="305" r:id="rId37"/>
+    <p:sldId id="309" r:id="rId38"/>
+    <p:sldId id="310" r:id="rId39"/>
   </p:sldIdLst>
   <p:sldSz cx="12192000" cy="6858000"/>
   <p:notesSz cx="6858000" cy="9144000"/>
@@ -232,7 +234,7 @@
           <a:p>
             <a:fld id="{7B6EC019-8BE9-4716-A045-AB4F46EC50AD}" type="datetimeFigureOut">
               <a:rPr lang="en-US" smtClean="0"/>
-              <a:t>6/2/2020</a:t>
+              <a:t>1/12/2021</a:t>
             </a:fld>
             <a:endParaRPr lang="en-US"/>
           </a:p>
@@ -3205,7 +3207,7 @@
           <a:p>
             <a:fld id="{5F6D1571-7249-4A7C-B463-A862308C856B}" type="datetimeFigureOut">
               <a:rPr lang="en-US" smtClean="0"/>
-              <a:t>6/2/2020</a:t>
+              <a:t>1/12/2021</a:t>
             </a:fld>
             <a:endParaRPr lang="en-US"/>
           </a:p>
@@ -3403,7 +3405,7 @@
           <a:p>
             <a:fld id="{5F6D1571-7249-4A7C-B463-A862308C856B}" type="datetimeFigureOut">
               <a:rPr lang="en-US" smtClean="0"/>
-              <a:t>6/2/2020</a:t>
+              <a:t>1/12/2021</a:t>
             </a:fld>
             <a:endParaRPr lang="en-US"/>
           </a:p>
@@ -3611,7 +3613,7 @@
           <a:p>
             <a:fld id="{5F6D1571-7249-4A7C-B463-A862308C856B}" type="datetimeFigureOut">
               <a:rPr lang="en-US" smtClean="0"/>
-              <a:t>6/2/2020</a:t>
+              <a:t>1/12/2021</a:t>
             </a:fld>
             <a:endParaRPr lang="en-US"/>
           </a:p>
@@ -3809,7 +3811,7 @@
           <a:p>
             <a:fld id="{5F6D1571-7249-4A7C-B463-A862308C856B}" type="datetimeFigureOut">
               <a:rPr lang="en-US" smtClean="0"/>
-              <a:t>6/2/2020</a:t>
+              <a:t>1/12/2021</a:t>
             </a:fld>
             <a:endParaRPr lang="en-US"/>
           </a:p>
@@ -4084,7 +4086,7 @@
           <a:p>
             <a:fld id="{5F6D1571-7249-4A7C-B463-A862308C856B}" type="datetimeFigureOut">
               <a:rPr lang="en-US" smtClean="0"/>
-              <a:t>6/2/2020</a:t>
+              <a:t>1/12/2021</a:t>
             </a:fld>
             <a:endParaRPr lang="en-US"/>
           </a:p>
@@ -4349,7 +4351,7 @@
           <a:p>
             <a:fld id="{5F6D1571-7249-4A7C-B463-A862308C856B}" type="datetimeFigureOut">
               <a:rPr lang="en-US" smtClean="0"/>
-              <a:t>6/2/2020</a:t>
+              <a:t>1/12/2021</a:t>
             </a:fld>
             <a:endParaRPr lang="en-US"/>
           </a:p>
@@ -4761,7 +4763,7 @@
           <a:p>
             <a:fld id="{5F6D1571-7249-4A7C-B463-A862308C856B}" type="datetimeFigureOut">
               <a:rPr lang="en-US" smtClean="0"/>
-              <a:t>6/2/2020</a:t>
+              <a:t>1/12/2021</a:t>
             </a:fld>
             <a:endParaRPr lang="en-US"/>
           </a:p>
@@ -4902,7 +4904,7 @@
           <a:p>
             <a:fld id="{5F6D1571-7249-4A7C-B463-A862308C856B}" type="datetimeFigureOut">
               <a:rPr lang="en-US" smtClean="0"/>
-              <a:t>6/2/2020</a:t>
+              <a:t>1/12/2021</a:t>
             </a:fld>
             <a:endParaRPr lang="en-US"/>
           </a:p>
@@ -5015,7 +5017,7 @@
           <a:p>
             <a:fld id="{5F6D1571-7249-4A7C-B463-A862308C856B}" type="datetimeFigureOut">
               <a:rPr lang="en-US" smtClean="0"/>
-              <a:t>6/2/2020</a:t>
+              <a:t>1/12/2021</a:t>
             </a:fld>
             <a:endParaRPr lang="en-US"/>
           </a:p>
@@ -5326,7 +5328,7 @@
           <a:p>
             <a:fld id="{5F6D1571-7249-4A7C-B463-A862308C856B}" type="datetimeFigureOut">
               <a:rPr lang="en-US" smtClean="0"/>
-              <a:t>6/2/2020</a:t>
+              <a:t>1/12/2021</a:t>
             </a:fld>
             <a:endParaRPr lang="en-US"/>
           </a:p>
@@ -5614,7 +5616,7 @@
           <a:p>
             <a:fld id="{5F6D1571-7249-4A7C-B463-A862308C856B}" type="datetimeFigureOut">
               <a:rPr lang="en-US" smtClean="0"/>
-              <a:t>6/2/2020</a:t>
+              <a:t>1/12/2021</a:t>
             </a:fld>
             <a:endParaRPr lang="en-US"/>
           </a:p>
@@ -5855,7 +5857,7 @@
           <a:p>
             <a:fld id="{5F6D1571-7249-4A7C-B463-A862308C856B}" type="datetimeFigureOut">
               <a:rPr lang="en-US" smtClean="0"/>
-              <a:t>6/2/2020</a:t>
+              <a:t>1/12/2021</a:t>
             </a:fld>
             <a:endParaRPr lang="en-US"/>
           </a:p>
@@ -27396,6 +27398,484 @@
 </p:sld>
 </file>
 
+<file path=ppt/slides/slide37.xml><?xml version="1.0" encoding="utf-8"?>
+<p:sld xmlns:a="http://schemas.openxmlformats.org/drawingml/2006/main" xmlns:r="http://schemas.openxmlformats.org/officeDocument/2006/relationships" xmlns:p="http://schemas.openxmlformats.org/presentationml/2006/main">
+  <p:cSld>
+    <p:spTree>
+      <p:nvGrpSpPr>
+        <p:cNvPr id="1" name=""/>
+        <p:cNvGrpSpPr/>
+        <p:nvPr/>
+      </p:nvGrpSpPr>
+      <p:grpSpPr>
+        <a:xfrm>
+          <a:off x="0" y="0"/>
+          <a:ext cx="0" cy="0"/>
+          <a:chOff x="0" y="0"/>
+          <a:chExt cx="0" cy="0"/>
+        </a:xfrm>
+      </p:grpSpPr>
+      <p:sp>
+        <p:nvSpPr>
+          <p:cNvPr id="4" name="Title 3">
+            <a:extLst>
+              <a:ext uri="{FF2B5EF4-FFF2-40B4-BE49-F238E27FC236}">
+                <a16:creationId xmlns:a16="http://schemas.microsoft.com/office/drawing/2014/main" id="{C9D9529E-D3C2-47EA-8463-9F716D3F328D}"/>
+              </a:ext>
+            </a:extLst>
+          </p:cNvPr>
+          <p:cNvSpPr>
+            <a:spLocks noGrp="1"/>
+          </p:cNvSpPr>
+          <p:nvPr>
+            <p:ph type="title"/>
+          </p:nvPr>
+        </p:nvSpPr>
+        <p:spPr/>
+        <p:txBody>
+          <a:bodyPr/>
+          <a:lstStyle/>
+          <a:p>
+            <a:r>
+              <a:rPr lang="en-US" dirty="0"/>
+              <a:t>K-Nearest Neighbors</a:t>
+            </a:r>
+          </a:p>
+        </p:txBody>
+      </p:sp>
+      <p:sp>
+        <p:nvSpPr>
+          <p:cNvPr id="5" name="Text Placeholder 4">
+            <a:extLst>
+              <a:ext uri="{FF2B5EF4-FFF2-40B4-BE49-F238E27FC236}">
+                <a16:creationId xmlns:a16="http://schemas.microsoft.com/office/drawing/2014/main" id="{097C5D3B-F6C0-4A8E-B45E-A90EAE06E39F}"/>
+              </a:ext>
+            </a:extLst>
+          </p:cNvPr>
+          <p:cNvSpPr>
+            <a:spLocks noGrp="1"/>
+          </p:cNvSpPr>
+          <p:nvPr>
+            <p:ph type="body" idx="1"/>
+          </p:nvPr>
+        </p:nvSpPr>
+        <p:spPr/>
+        <p:txBody>
+          <a:bodyPr/>
+          <a:lstStyle/>
+          <a:p>
+            <a:endParaRPr lang="en-US"/>
+          </a:p>
+        </p:txBody>
+      </p:sp>
+    </p:spTree>
+    <p:extLst>
+      <p:ext uri="{BB962C8B-B14F-4D97-AF65-F5344CB8AC3E}">
+        <p14:creationId xmlns:p14="http://schemas.microsoft.com/office/powerpoint/2010/main" val="2918483498"/>
+      </p:ext>
+    </p:extLst>
+  </p:cSld>
+  <p:clrMapOvr>
+    <a:masterClrMapping/>
+  </p:clrMapOvr>
+</p:sld>
+</file>
+
+<file path=ppt/slides/slide38.xml><?xml version="1.0" encoding="utf-8"?>
+<p:sld xmlns:a="http://schemas.openxmlformats.org/drawingml/2006/main" xmlns:r="http://schemas.openxmlformats.org/officeDocument/2006/relationships" xmlns:p="http://schemas.openxmlformats.org/presentationml/2006/main">
+  <p:cSld>
+    <p:spTree>
+      <p:nvGrpSpPr>
+        <p:cNvPr id="1" name=""/>
+        <p:cNvGrpSpPr/>
+        <p:nvPr/>
+      </p:nvGrpSpPr>
+      <p:grpSpPr>
+        <a:xfrm>
+          <a:off x="0" y="0"/>
+          <a:ext cx="0" cy="0"/>
+          <a:chOff x="0" y="0"/>
+          <a:chExt cx="0" cy="0"/>
+        </a:xfrm>
+      </p:grpSpPr>
+      <p:sp>
+        <p:nvSpPr>
+          <p:cNvPr id="5" name="TextBox 4">
+            <a:extLst>
+              <a:ext uri="{FF2B5EF4-FFF2-40B4-BE49-F238E27FC236}">
+                <a16:creationId xmlns:a16="http://schemas.microsoft.com/office/drawing/2014/main" id="{1AF04FE2-C4ED-497F-B1E3-FB30648C25DD}"/>
+              </a:ext>
+            </a:extLst>
+          </p:cNvPr>
+          <p:cNvSpPr txBox="1"/>
+          <p:nvPr/>
+        </p:nvSpPr>
+        <p:spPr>
+          <a:xfrm>
+            <a:off x="0" y="6488668"/>
+            <a:ext cx="10176933" cy="369332"/>
+          </a:xfrm>
+          <a:prstGeom prst="rect">
+            <a:avLst/>
+          </a:prstGeom>
+          <a:noFill/>
+        </p:spPr>
+        <p:txBody>
+          <a:bodyPr wrap="square">
+            <a:spAutoFit/>
+          </a:bodyPr>
+          <a:lstStyle/>
+          <a:p>
+            <a:r>
+              <a:rPr lang="en-US" dirty="0">
+                <a:hlinkClick r:id="rId2"/>
+              </a:rPr>
+              <a:t>https://www.analyticsvidhya.com/blog/2018/08/k-nearest-neighbor-introduction-regression-python/</a:t>
+            </a:r>
+            <a:endParaRPr lang="en-US" dirty="0"/>
+          </a:p>
+        </p:txBody>
+      </p:sp>
+      <p:pic>
+        <p:nvPicPr>
+          <p:cNvPr id="1028" name="Picture 4">
+            <a:extLst>
+              <a:ext uri="{FF2B5EF4-FFF2-40B4-BE49-F238E27FC236}">
+                <a16:creationId xmlns:a16="http://schemas.microsoft.com/office/drawing/2014/main" id="{92E0A149-F640-4D3E-A9EB-D1761ED0A41A}"/>
+              </a:ext>
+            </a:extLst>
+          </p:cNvPr>
+          <p:cNvPicPr>
+            <a:picLocks noChangeAspect="1" noChangeArrowheads="1"/>
+          </p:cNvPicPr>
+          <p:nvPr/>
+        </p:nvPicPr>
+        <p:blipFill>
+          <a:blip r:embed="rId3">
+            <a:extLst>
+              <a:ext uri="{28A0092B-C50C-407E-A947-70E740481C1C}">
+                <a14:useLocalDpi xmlns:a14="http://schemas.microsoft.com/office/drawing/2010/main" val="0"/>
+              </a:ext>
+            </a:extLst>
+          </a:blip>
+          <a:srcRect/>
+          <a:stretch>
+            <a:fillRect/>
+          </a:stretch>
+        </p:blipFill>
+        <p:spPr bwMode="auto">
+          <a:xfrm>
+            <a:off x="118533" y="3169540"/>
+            <a:ext cx="5164667" cy="2835376"/>
+          </a:xfrm>
+          <a:prstGeom prst="rect">
+            <a:avLst/>
+          </a:prstGeom>
+          <a:noFill/>
+          <a:extLst>
+            <a:ext uri="{909E8E84-426E-40DD-AFC4-6F175D3DCCD1}">
+              <a14:hiddenFill xmlns:a14="http://schemas.microsoft.com/office/drawing/2010/main">
+                <a:solidFill>
+                  <a:srgbClr val="FFFFFF"/>
+                </a:solidFill>
+              </a14:hiddenFill>
+            </a:ext>
+          </a:extLst>
+        </p:spPr>
+      </p:pic>
+      <mc:AlternateContent xmlns:mc="http://schemas.openxmlformats.org/markup-compatibility/2006">
+        <mc:Choice xmlns:a14="http://schemas.microsoft.com/office/drawing/2010/main" Requires="a14">
+          <p:sp>
+            <p:nvSpPr>
+              <p:cNvPr id="6" name="TextBox 5">
+                <a:extLst>
+                  <a:ext uri="{FF2B5EF4-FFF2-40B4-BE49-F238E27FC236}">
+                    <a16:creationId xmlns:a16="http://schemas.microsoft.com/office/drawing/2014/main" id="{C684FE79-2B18-45CD-84F9-1DBAC3452AE0}"/>
+                  </a:ext>
+                </a:extLst>
+              </p:cNvPr>
+              <p:cNvSpPr txBox="1"/>
+              <p:nvPr/>
+            </p:nvSpPr>
+            <p:spPr>
+              <a:xfrm>
+                <a:off x="525990" y="422743"/>
+                <a:ext cx="4367743" cy="1200329"/>
+              </a:xfrm>
+              <a:prstGeom prst="rect">
+                <a:avLst/>
+              </a:prstGeom>
+              <a:noFill/>
+            </p:spPr>
+            <p:txBody>
+              <a:bodyPr wrap="square" rtlCol="0">
+                <a:spAutoFit/>
+              </a:bodyPr>
+              <a:lstStyle/>
+              <a:p>
+                <a:r>
+                  <a:rPr lang="en-US" dirty="0"/>
+                  <a:t>Just estimate the desired instance by using the </a:t>
+                </a:r>
+                <a14:m>
+                  <m:oMath xmlns:m="http://schemas.openxmlformats.org/officeDocument/2006/math">
+                    <m:r>
+                      <a:rPr lang="en-US" b="0" i="1" smtClean="0">
+                        <a:latin typeface="Cambria Math" panose="02040503050406030204" pitchFamily="18" charset="0"/>
+                      </a:rPr>
+                      <m:t>𝑘</m:t>
+                    </m:r>
+                    <m:r>
+                      <a:rPr lang="en-US" b="0" i="0" smtClean="0">
+                        <a:latin typeface="Cambria Math" panose="02040503050406030204" pitchFamily="18" charset="0"/>
+                      </a:rPr>
+                      <m:t>−</m:t>
+                    </m:r>
+                  </m:oMath>
+                </a14:m>
+                <a:r>
+                  <a:rPr lang="en-US" dirty="0"/>
+                  <a:t> nearest neighbors. For regression,  use (maybe distance weighted) average, for classification use voting</a:t>
+                </a:r>
+              </a:p>
+            </p:txBody>
+          </p:sp>
+        </mc:Choice>
+        <mc:Fallback>
+          <p:sp>
+            <p:nvSpPr>
+              <p:cNvPr id="6" name="TextBox 5">
+                <a:extLst>
+                  <a:ext uri="{FF2B5EF4-FFF2-40B4-BE49-F238E27FC236}">
+                    <a16:creationId xmlns:a16="http://schemas.microsoft.com/office/drawing/2014/main" id="{C684FE79-2B18-45CD-84F9-1DBAC3452AE0}"/>
+                  </a:ext>
+                </a:extLst>
+              </p:cNvPr>
+              <p:cNvSpPr txBox="1">
+                <a:spLocks noRot="1" noChangeAspect="1" noMove="1" noResize="1" noEditPoints="1" noAdjustHandles="1" noChangeArrowheads="1" noChangeShapeType="1" noTextEdit="1"/>
+              </p:cNvSpPr>
+              <p:nvPr/>
+            </p:nvSpPr>
+            <p:spPr>
+              <a:xfrm>
+                <a:off x="525990" y="422743"/>
+                <a:ext cx="4367743" cy="1200329"/>
+              </a:xfrm>
+              <a:prstGeom prst="rect">
+                <a:avLst/>
+              </a:prstGeom>
+              <a:blipFill>
+                <a:blip r:embed="rId4"/>
+                <a:stretch>
+                  <a:fillRect l="-1116" t="-2538" b="-7107"/>
+                </a:stretch>
+              </a:blipFill>
+            </p:spPr>
+            <p:txBody>
+              <a:bodyPr/>
+              <a:lstStyle/>
+              <a:p>
+                <a:r>
+                  <a:rPr lang="en-US">
+                    <a:noFill/>
+                  </a:rPr>
+                  <a:t> </a:t>
+                </a:r>
+              </a:p>
+            </p:txBody>
+          </p:sp>
+        </mc:Fallback>
+      </mc:AlternateContent>
+      <p:pic>
+        <p:nvPicPr>
+          <p:cNvPr id="1030" name="Picture 6">
+            <a:extLst>
+              <a:ext uri="{FF2B5EF4-FFF2-40B4-BE49-F238E27FC236}">
+                <a16:creationId xmlns:a16="http://schemas.microsoft.com/office/drawing/2014/main" id="{6B88DCBD-5740-4EF1-A756-8ABEC50E87CD}"/>
+              </a:ext>
+            </a:extLst>
+          </p:cNvPr>
+          <p:cNvPicPr>
+            <a:picLocks noChangeAspect="1" noChangeArrowheads="1"/>
+          </p:cNvPicPr>
+          <p:nvPr/>
+        </p:nvPicPr>
+        <p:blipFill>
+          <a:blip r:embed="rId5">
+            <a:extLst>
+              <a:ext uri="{28A0092B-C50C-407E-A947-70E740481C1C}">
+                <a14:useLocalDpi xmlns:a14="http://schemas.microsoft.com/office/drawing/2010/main" val="0"/>
+              </a:ext>
+            </a:extLst>
+          </a:blip>
+          <a:srcRect/>
+          <a:stretch>
+            <a:fillRect/>
+          </a:stretch>
+        </p:blipFill>
+        <p:spPr bwMode="auto">
+          <a:xfrm>
+            <a:off x="5641744" y="25087"/>
+            <a:ext cx="5959845" cy="3657600"/>
+          </a:xfrm>
+          <a:prstGeom prst="rect">
+            <a:avLst/>
+          </a:prstGeom>
+          <a:noFill/>
+          <a:extLst>
+            <a:ext uri="{909E8E84-426E-40DD-AFC4-6F175D3DCCD1}">
+              <a14:hiddenFill xmlns:a14="http://schemas.microsoft.com/office/drawing/2010/main">
+                <a:solidFill>
+                  <a:srgbClr val="FFFFFF"/>
+                </a:solidFill>
+              </a14:hiddenFill>
+            </a:ext>
+          </a:extLst>
+        </p:spPr>
+      </p:pic>
+      <p:pic>
+        <p:nvPicPr>
+          <p:cNvPr id="1026" name="Picture 2">
+            <a:extLst>
+              <a:ext uri="{FF2B5EF4-FFF2-40B4-BE49-F238E27FC236}">
+                <a16:creationId xmlns:a16="http://schemas.microsoft.com/office/drawing/2014/main" id="{21531B1E-5F4D-4DED-B6FF-EE9BAEB10749}"/>
+              </a:ext>
+            </a:extLst>
+          </p:cNvPr>
+          <p:cNvPicPr>
+            <a:picLocks noChangeAspect="1" noChangeArrowheads="1"/>
+          </p:cNvPicPr>
+          <p:nvPr/>
+        </p:nvPicPr>
+        <p:blipFill>
+          <a:blip r:embed="rId6">
+            <a:extLst>
+              <a:ext uri="{28A0092B-C50C-407E-A947-70E740481C1C}">
+                <a14:useLocalDpi xmlns:a14="http://schemas.microsoft.com/office/drawing/2010/main" val="0"/>
+              </a:ext>
+            </a:extLst>
+          </a:blip>
+          <a:srcRect/>
+          <a:stretch>
+            <a:fillRect/>
+          </a:stretch>
+        </p:blipFill>
+        <p:spPr bwMode="auto">
+          <a:xfrm>
+            <a:off x="5595149" y="58953"/>
+            <a:ext cx="6070861" cy="3657600"/>
+          </a:xfrm>
+          <a:prstGeom prst="rect">
+            <a:avLst/>
+          </a:prstGeom>
+          <a:noFill/>
+          <a:extLst>
+            <a:ext uri="{909E8E84-426E-40DD-AFC4-6F175D3DCCD1}">
+              <a14:hiddenFill xmlns:a14="http://schemas.microsoft.com/office/drawing/2010/main">
+                <a:solidFill>
+                  <a:srgbClr val="FFFFFF"/>
+                </a:solidFill>
+              </a14:hiddenFill>
+            </a:ext>
+          </a:extLst>
+        </p:spPr>
+      </p:pic>
+    </p:spTree>
+    <p:extLst>
+      <p:ext uri="{BB962C8B-B14F-4D97-AF65-F5344CB8AC3E}">
+        <p14:creationId xmlns:p14="http://schemas.microsoft.com/office/powerpoint/2010/main" val="3899572982"/>
+      </p:ext>
+    </p:extLst>
+  </p:cSld>
+  <p:clrMapOvr>
+    <a:masterClrMapping/>
+  </p:clrMapOvr>
+  <p:timing>
+    <p:tnLst>
+      <p:par>
+        <p:cTn id="1" dur="indefinite" restart="never" nodeType="tmRoot">
+          <p:childTnLst>
+            <p:seq concurrent="1" nextAc="seek">
+              <p:cTn id="2" dur="indefinite" nodeType="mainSeq">
+                <p:childTnLst>
+                  <p:par>
+                    <p:cTn id="3" fill="hold">
+                      <p:stCondLst>
+                        <p:cond delay="indefinite"/>
+                      </p:stCondLst>
+                      <p:childTnLst>
+                        <p:par>
+                          <p:cTn id="4" fill="hold">
+                            <p:stCondLst>
+                              <p:cond delay="0"/>
+                            </p:stCondLst>
+                            <p:childTnLst>
+                              <p:par>
+                                <p:cTn id="5" presetID="10" presetClass="entr" presetSubtype="0" fill="hold" nodeType="clickEffect">
+                                  <p:stCondLst>
+                                    <p:cond delay="0"/>
+                                  </p:stCondLst>
+                                  <p:childTnLst>
+                                    <p:set>
+                                      <p:cBhvr>
+                                        <p:cTn id="6" dur="1" fill="hold">
+                                          <p:stCondLst>
+                                            <p:cond delay="0"/>
+                                          </p:stCondLst>
+                                        </p:cTn>
+                                        <p:tgtEl>
+                                          <p:spTgt spid="1026"/>
+                                        </p:tgtEl>
+                                        <p:attrNameLst>
+                                          <p:attrName>style.visibility</p:attrName>
+                                        </p:attrNameLst>
+                                      </p:cBhvr>
+                                      <p:to>
+                                        <p:strVal val="visible"/>
+                                      </p:to>
+                                    </p:set>
+                                    <p:animEffect transition="in" filter="fade">
+                                      <p:cBhvr>
+                                        <p:cTn id="7" dur="500"/>
+                                        <p:tgtEl>
+                                          <p:spTgt spid="1026"/>
+                                        </p:tgtEl>
+                                      </p:cBhvr>
+                                    </p:animEffect>
+                                  </p:childTnLst>
+                                </p:cTn>
+                              </p:par>
+                            </p:childTnLst>
+                          </p:cTn>
+                        </p:par>
+                      </p:childTnLst>
+                    </p:cTn>
+                  </p:par>
+                </p:childTnLst>
+              </p:cTn>
+              <p:prevCondLst>
+                <p:cond evt="onPrev" delay="0">
+                  <p:tgtEl>
+                    <p:sldTgt/>
+                  </p:tgtEl>
+                </p:cond>
+              </p:prevCondLst>
+              <p:nextCondLst>
+                <p:cond evt="onNext" delay="0">
+                  <p:tgtEl>
+                    <p:sldTgt/>
+                  </p:tgtEl>
+                </p:cond>
+              </p:nextCondLst>
+            </p:seq>
+          </p:childTnLst>
+        </p:cTn>
+      </p:par>
+    </p:tnLst>
+  </p:timing>
+</p:sld>
+</file>
+
 <file path=ppt/slides/slide4.xml><?xml version="1.0" encoding="utf-8"?>
 <p:sld xmlns:a="http://schemas.openxmlformats.org/drawingml/2006/main" xmlns:r="http://schemas.openxmlformats.org/officeDocument/2006/relationships" xmlns:p="http://schemas.openxmlformats.org/presentationml/2006/main">
   <p:cSld>

</xml_diff>